<commit_message>
format the puzzle output
</commit_message>
<xml_diff>
--- a/440 MP2 figures.pptx
+++ b/440 MP2 figures.pptx
@@ -111,6 +111,11 @@
       </a:defRPr>
     </a:lvl9pPr>
   </p:defaultTextStyle>
+  <p:extLst>
+    <p:ext uri="{EFAFB233-063F-42B5-8137-9DF3F51BA10A}">
+      <p15:sldGuideLst xmlns:p15="http://schemas.microsoft.com/office/powerpoint/2012/main"/>
+    </p:ext>
+  </p:extLst>
 </p:presentation>
 </file>
 
@@ -196,7 +201,7 @@
           <a:p>
             <a:fld id="{3F9ED378-2067-1A43-A5F6-241876212B8D}" type="datetimeFigureOut">
               <a:rPr lang="en-US" smtClean="0"/>
-              <a:t>10/28/17</a:t>
+              <a:t>10/29/17</a:t>
             </a:fld>
             <a:endParaRPr lang="en-US"/>
           </a:p>
@@ -679,7 +684,7 @@
           <a:p>
             <a:fld id="{A3751E9C-1B53-3E4E-B175-4A8E65E196D8}" type="datetimeFigureOut">
               <a:rPr lang="en-US" smtClean="0"/>
-              <a:t>10/28/17</a:t>
+              <a:t>10/29/17</a:t>
             </a:fld>
             <a:endParaRPr lang="en-US"/>
           </a:p>
@@ -849,7 +854,7 @@
           <a:p>
             <a:fld id="{A3751E9C-1B53-3E4E-B175-4A8E65E196D8}" type="datetimeFigureOut">
               <a:rPr lang="en-US" smtClean="0"/>
-              <a:t>10/28/17</a:t>
+              <a:t>10/29/17</a:t>
             </a:fld>
             <a:endParaRPr lang="en-US"/>
           </a:p>
@@ -1029,7 +1034,7 @@
           <a:p>
             <a:fld id="{A3751E9C-1B53-3E4E-B175-4A8E65E196D8}" type="datetimeFigureOut">
               <a:rPr lang="en-US" smtClean="0"/>
-              <a:t>10/28/17</a:t>
+              <a:t>10/29/17</a:t>
             </a:fld>
             <a:endParaRPr lang="en-US"/>
           </a:p>
@@ -1199,7 +1204,7 @@
           <a:p>
             <a:fld id="{A3751E9C-1B53-3E4E-B175-4A8E65E196D8}" type="datetimeFigureOut">
               <a:rPr lang="en-US" smtClean="0"/>
-              <a:t>10/28/17</a:t>
+              <a:t>10/29/17</a:t>
             </a:fld>
             <a:endParaRPr lang="en-US"/>
           </a:p>
@@ -1445,7 +1450,7 @@
           <a:p>
             <a:fld id="{A3751E9C-1B53-3E4E-B175-4A8E65E196D8}" type="datetimeFigureOut">
               <a:rPr lang="en-US" smtClean="0"/>
-              <a:t>10/28/17</a:t>
+              <a:t>10/29/17</a:t>
             </a:fld>
             <a:endParaRPr lang="en-US"/>
           </a:p>
@@ -1677,7 +1682,7 @@
           <a:p>
             <a:fld id="{A3751E9C-1B53-3E4E-B175-4A8E65E196D8}" type="datetimeFigureOut">
               <a:rPr lang="en-US" smtClean="0"/>
-              <a:t>10/28/17</a:t>
+              <a:t>10/29/17</a:t>
             </a:fld>
             <a:endParaRPr lang="en-US"/>
           </a:p>
@@ -2044,7 +2049,7 @@
           <a:p>
             <a:fld id="{A3751E9C-1B53-3E4E-B175-4A8E65E196D8}" type="datetimeFigureOut">
               <a:rPr lang="en-US" smtClean="0"/>
-              <a:t>10/28/17</a:t>
+              <a:t>10/29/17</a:t>
             </a:fld>
             <a:endParaRPr lang="en-US"/>
           </a:p>
@@ -2162,7 +2167,7 @@
           <a:p>
             <a:fld id="{A3751E9C-1B53-3E4E-B175-4A8E65E196D8}" type="datetimeFigureOut">
               <a:rPr lang="en-US" smtClean="0"/>
-              <a:t>10/28/17</a:t>
+              <a:t>10/29/17</a:t>
             </a:fld>
             <a:endParaRPr lang="en-US"/>
           </a:p>
@@ -2257,7 +2262,7 @@
           <a:p>
             <a:fld id="{A3751E9C-1B53-3E4E-B175-4A8E65E196D8}" type="datetimeFigureOut">
               <a:rPr lang="en-US" smtClean="0"/>
-              <a:t>10/28/17</a:t>
+              <a:t>10/29/17</a:t>
             </a:fld>
             <a:endParaRPr lang="en-US"/>
           </a:p>
@@ -2534,7 +2539,7 @@
           <a:p>
             <a:fld id="{A3751E9C-1B53-3E4E-B175-4A8E65E196D8}" type="datetimeFigureOut">
               <a:rPr lang="en-US" smtClean="0"/>
-              <a:t>10/28/17</a:t>
+              <a:t>10/29/17</a:t>
             </a:fld>
             <a:endParaRPr lang="en-US"/>
           </a:p>
@@ -2787,7 +2792,7 @@
           <a:p>
             <a:fld id="{A3751E9C-1B53-3E4E-B175-4A8E65E196D8}" type="datetimeFigureOut">
               <a:rPr lang="en-US" smtClean="0"/>
-              <a:t>10/28/17</a:t>
+              <a:t>10/29/17</a:t>
             </a:fld>
             <a:endParaRPr lang="en-US"/>
           </a:p>
@@ -3000,7 +3005,7 @@
           <a:p>
             <a:fld id="{A3751E9C-1B53-3E4E-B175-4A8E65E196D8}" type="datetimeFigureOut">
               <a:rPr lang="en-US" smtClean="0"/>
-              <a:t>10/28/17</a:t>
+              <a:t>10/29/17</a:t>
             </a:fld>
             <a:endParaRPr lang="en-US"/>
           </a:p>
@@ -38054,106 +38059,6 @@
       </p:sp>
       <p:sp>
         <p:nvSpPr>
-          <p:cNvPr id="20" name="Oval 19"/>
-          <p:cNvSpPr/>
-          <p:nvPr/>
-        </p:nvSpPr>
-        <p:spPr>
-          <a:xfrm>
-            <a:off x="5974146" y="3858940"/>
-            <a:ext cx="300942" cy="300942"/>
-          </a:xfrm>
-          <a:prstGeom prst="ellipse">
-            <a:avLst/>
-          </a:prstGeom>
-          <a:solidFill>
-            <a:schemeClr val="accent4">
-              <a:lumMod val="50000"/>
-            </a:schemeClr>
-          </a:solidFill>
-          <a:ln>
-            <a:solidFill>
-              <a:schemeClr val="accent3"/>
-            </a:solidFill>
-          </a:ln>
-        </p:spPr>
-        <p:style>
-          <a:lnRef idx="2">
-            <a:schemeClr val="accent1">
-              <a:shade val="50000"/>
-            </a:schemeClr>
-          </a:lnRef>
-          <a:fillRef idx="1">
-            <a:schemeClr val="accent1"/>
-          </a:fillRef>
-          <a:effectRef idx="0">
-            <a:schemeClr val="accent1"/>
-          </a:effectRef>
-          <a:fontRef idx="minor">
-            <a:schemeClr val="lt1"/>
-          </a:fontRef>
-        </p:style>
-        <p:txBody>
-          <a:bodyPr rtlCol="0" anchor="ctr"/>
-          <a:lstStyle/>
-          <a:p>
-            <a:pPr algn="ctr"/>
-            <a:endParaRPr lang="en-US" dirty="0"/>
-          </a:p>
-        </p:txBody>
-      </p:sp>
-      <p:sp>
-        <p:nvSpPr>
-          <p:cNvPr id="21" name="Oval 20"/>
-          <p:cNvSpPr/>
-          <p:nvPr/>
-        </p:nvSpPr>
-        <p:spPr>
-          <a:xfrm>
-            <a:off x="8815367" y="3525842"/>
-            <a:ext cx="300942" cy="300942"/>
-          </a:xfrm>
-          <a:prstGeom prst="ellipse">
-            <a:avLst/>
-          </a:prstGeom>
-          <a:solidFill>
-            <a:schemeClr val="accent4">
-              <a:lumMod val="50000"/>
-            </a:schemeClr>
-          </a:solidFill>
-          <a:ln>
-            <a:solidFill>
-              <a:schemeClr val="accent3"/>
-            </a:solidFill>
-          </a:ln>
-        </p:spPr>
-        <p:style>
-          <a:lnRef idx="2">
-            <a:schemeClr val="accent1">
-              <a:shade val="50000"/>
-            </a:schemeClr>
-          </a:lnRef>
-          <a:fillRef idx="1">
-            <a:schemeClr val="accent1"/>
-          </a:fillRef>
-          <a:effectRef idx="0">
-            <a:schemeClr val="accent1"/>
-          </a:effectRef>
-          <a:fontRef idx="minor">
-            <a:schemeClr val="lt1"/>
-          </a:fontRef>
-        </p:style>
-        <p:txBody>
-          <a:bodyPr rtlCol="0" anchor="ctr"/>
-          <a:lstStyle/>
-          <a:p>
-            <a:pPr algn="ctr"/>
-            <a:endParaRPr lang="en-US" dirty="0"/>
-          </a:p>
-        </p:txBody>
-      </p:sp>
-      <p:sp>
-        <p:nvSpPr>
           <p:cNvPr id="22" name="Oval 21"/>
           <p:cNvSpPr/>
           <p:nvPr/>
@@ -38359,43 +38264,6 @@
       </p:cxnSp>
       <p:cxnSp>
         <p:nvCxnSpPr>
-          <p:cNvPr id="28" name="Elbow Connector 27"/>
-          <p:cNvCxnSpPr/>
-          <p:nvPr/>
-        </p:nvCxnSpPr>
-        <p:spPr>
-          <a:xfrm rot="10800000">
-            <a:off x="7028284" y="5292005"/>
-            <a:ext cx="1781356" cy="986005"/>
-          </a:xfrm>
-          <a:prstGeom prst="bentConnector3">
-            <a:avLst>
-              <a:gd name="adj1" fmla="val 99382"/>
-            </a:avLst>
-          </a:prstGeom>
-          <a:ln w="76200">
-            <a:solidFill>
-              <a:schemeClr val="accent1"/>
-            </a:solidFill>
-          </a:ln>
-        </p:spPr>
-        <p:style>
-          <a:lnRef idx="1">
-            <a:schemeClr val="accent1"/>
-          </a:lnRef>
-          <a:fillRef idx="0">
-            <a:schemeClr val="accent1"/>
-          </a:fillRef>
-          <a:effectRef idx="0">
-            <a:schemeClr val="accent1"/>
-          </a:effectRef>
-          <a:fontRef idx="minor">
-            <a:schemeClr val="tx1"/>
-          </a:fontRef>
-        </p:style>
-      </p:cxnSp>
-      <p:cxnSp>
-        <p:nvCxnSpPr>
           <p:cNvPr id="29" name="Straight Arrow Connector 28"/>
           <p:cNvCxnSpPr>
             <a:stCxn id="8" idx="6"/>
@@ -38416,84 +38284,6 @@
               <a:schemeClr val="accent1"/>
             </a:solidFill>
             <a:tailEnd type="triangle"/>
-          </a:ln>
-        </p:spPr>
-        <p:style>
-          <a:lnRef idx="1">
-            <a:schemeClr val="accent1"/>
-          </a:lnRef>
-          <a:fillRef idx="0">
-            <a:schemeClr val="accent1"/>
-          </a:fillRef>
-          <a:effectRef idx="0">
-            <a:schemeClr val="accent1"/>
-          </a:effectRef>
-          <a:fontRef idx="minor">
-            <a:schemeClr val="tx1"/>
-          </a:fontRef>
-        </p:style>
-      </p:cxnSp>
-      <p:cxnSp>
-        <p:nvCxnSpPr>
-          <p:cNvPr id="30" name="Elbow Connector 29"/>
-          <p:cNvCxnSpPr/>
-          <p:nvPr/>
-        </p:nvCxnSpPr>
-        <p:spPr>
-          <a:xfrm flipV="1">
-            <a:off x="8100087" y="417917"/>
-            <a:ext cx="1776603" cy="506847"/>
-          </a:xfrm>
-          <a:prstGeom prst="bentConnector3">
-            <a:avLst>
-              <a:gd name="adj1" fmla="val -166"/>
-            </a:avLst>
-          </a:prstGeom>
-          <a:ln w="76200">
-            <a:solidFill>
-              <a:schemeClr val="bg1">
-                <a:lumMod val="50000"/>
-              </a:schemeClr>
-            </a:solidFill>
-          </a:ln>
-        </p:spPr>
-        <p:style>
-          <a:lnRef idx="1">
-            <a:schemeClr val="accent1"/>
-          </a:lnRef>
-          <a:fillRef idx="0">
-            <a:schemeClr val="accent1"/>
-          </a:fillRef>
-          <a:effectRef idx="0">
-            <a:schemeClr val="accent1"/>
-          </a:effectRef>
-          <a:fontRef idx="minor">
-            <a:schemeClr val="tx1"/>
-          </a:fontRef>
-        </p:style>
-      </p:cxnSp>
-      <p:cxnSp>
-        <p:nvCxnSpPr>
-          <p:cNvPr id="31" name="Elbow Connector 30"/>
-          <p:cNvCxnSpPr/>
-          <p:nvPr/>
-        </p:nvCxnSpPr>
-        <p:spPr>
-          <a:xfrm rot="16200000" flipH="1">
-            <a:off x="9066791" y="1461246"/>
-            <a:ext cx="1980997" cy="482822"/>
-          </a:xfrm>
-          <a:prstGeom prst="bentConnector3">
-            <a:avLst>
-              <a:gd name="adj1" fmla="val 100249"/>
-            </a:avLst>
-          </a:prstGeom>
-          <a:ln w="76200">
-            <a:solidFill>
-              <a:schemeClr val="bg1">
-                <a:lumMod val="50000"/>
-              </a:schemeClr>
-            </a:solidFill>
           </a:ln>
         </p:spPr>
         <p:style>
@@ -38552,122 +38342,6 @@
       </p:cxnSp>
       <p:cxnSp>
         <p:nvCxnSpPr>
-          <p:cNvPr id="34" name="Elbow Connector 33"/>
-          <p:cNvCxnSpPr/>
-          <p:nvPr/>
-        </p:nvCxnSpPr>
-        <p:spPr>
-          <a:xfrm rot="16200000" flipH="1">
-            <a:off x="8642845" y="2060790"/>
-            <a:ext cx="1977358" cy="441964"/>
-          </a:xfrm>
-          <a:prstGeom prst="bentConnector3">
-            <a:avLst>
-              <a:gd name="adj1" fmla="val 98000"/>
-            </a:avLst>
-          </a:prstGeom>
-          <a:ln w="76200">
-            <a:solidFill>
-              <a:schemeClr val="accent4"/>
-            </a:solidFill>
-          </a:ln>
-        </p:spPr>
-        <p:style>
-          <a:lnRef idx="1">
-            <a:schemeClr val="accent1"/>
-          </a:lnRef>
-          <a:fillRef idx="0">
-            <a:schemeClr val="accent1"/>
-          </a:fillRef>
-          <a:effectRef idx="0">
-            <a:schemeClr val="accent1"/>
-          </a:effectRef>
-          <a:fontRef idx="minor">
-            <a:schemeClr val="tx1"/>
-          </a:fontRef>
-        </p:style>
-      </p:cxnSp>
-      <p:cxnSp>
-        <p:nvCxnSpPr>
-          <p:cNvPr id="35" name="Elbow Connector 34"/>
-          <p:cNvCxnSpPr/>
-          <p:nvPr/>
-        </p:nvCxnSpPr>
-        <p:spPr>
-          <a:xfrm rot="16200000" flipH="1">
-            <a:off x="8453789" y="4318179"/>
-            <a:ext cx="1108765" cy="913400"/>
-          </a:xfrm>
-          <a:prstGeom prst="bentConnector3">
-            <a:avLst>
-              <a:gd name="adj1" fmla="val 131057"/>
-            </a:avLst>
-          </a:prstGeom>
-          <a:ln w="76200">
-            <a:solidFill>
-              <a:schemeClr val="accent4">
-                <a:lumMod val="50000"/>
-              </a:schemeClr>
-            </a:solidFill>
-          </a:ln>
-        </p:spPr>
-        <p:style>
-          <a:lnRef idx="1">
-            <a:schemeClr val="accent1"/>
-          </a:lnRef>
-          <a:fillRef idx="0">
-            <a:schemeClr val="accent1"/>
-          </a:fillRef>
-          <a:effectRef idx="0">
-            <a:schemeClr val="accent1"/>
-          </a:effectRef>
-          <a:fontRef idx="minor">
-            <a:schemeClr val="tx1"/>
-          </a:fontRef>
-        </p:style>
-      </p:cxnSp>
-      <p:cxnSp>
-        <p:nvCxnSpPr>
-          <p:cNvPr id="36" name="Elbow Connector 35"/>
-          <p:cNvCxnSpPr/>
-          <p:nvPr/>
-        </p:nvCxnSpPr>
-        <p:spPr>
-          <a:xfrm>
-            <a:off x="6751373" y="2663711"/>
-            <a:ext cx="2192557" cy="1017505"/>
-          </a:xfrm>
-          <a:prstGeom prst="bentConnector3">
-            <a:avLst>
-              <a:gd name="adj1" fmla="val 100679"/>
-            </a:avLst>
-          </a:prstGeom>
-          <a:ln w="76200">
-            <a:solidFill>
-              <a:schemeClr val="accent4">
-                <a:lumMod val="50000"/>
-              </a:schemeClr>
-            </a:solidFill>
-            <a:tailEnd type="triangle"/>
-          </a:ln>
-        </p:spPr>
-        <p:style>
-          <a:lnRef idx="1">
-            <a:schemeClr val="accent1"/>
-          </a:lnRef>
-          <a:fillRef idx="0">
-            <a:schemeClr val="accent1"/>
-          </a:fillRef>
-          <a:effectRef idx="0">
-            <a:schemeClr val="accent1"/>
-          </a:effectRef>
-          <a:fontRef idx="minor">
-            <a:schemeClr val="tx1"/>
-          </a:fontRef>
-        </p:style>
-      </p:cxnSp>
-      <p:cxnSp>
-        <p:nvCxnSpPr>
           <p:cNvPr id="37" name="Elbow Connector 36"/>
           <p:cNvCxnSpPr/>
           <p:nvPr/>
@@ -38689,42 +38363,6 @@
                 <a:lumOff val="60000"/>
               </a:schemeClr>
             </a:solidFill>
-          </a:ln>
-        </p:spPr>
-        <p:style>
-          <a:lnRef idx="1">
-            <a:schemeClr val="accent1"/>
-          </a:lnRef>
-          <a:fillRef idx="0">
-            <a:schemeClr val="accent1"/>
-          </a:fillRef>
-          <a:effectRef idx="0">
-            <a:schemeClr val="accent1"/>
-          </a:effectRef>
-          <a:fontRef idx="minor">
-            <a:schemeClr val="tx1"/>
-          </a:fontRef>
-        </p:style>
-      </p:cxnSp>
-      <p:cxnSp>
-        <p:nvCxnSpPr>
-          <p:cNvPr id="38" name="Straight Arrow Connector 37"/>
-          <p:cNvCxnSpPr/>
-          <p:nvPr/>
-        </p:nvCxnSpPr>
-        <p:spPr>
-          <a:xfrm>
-            <a:off x="8705466" y="2626535"/>
-            <a:ext cx="15388" cy="469879"/>
-          </a:xfrm>
-          <a:prstGeom prst="straightConnector1">
-            <a:avLst/>
-          </a:prstGeom>
-          <a:ln w="76200">
-            <a:solidFill>
-              <a:srgbClr val="4BFFF9"/>
-            </a:solidFill>
-            <a:tailEnd type="triangle"/>
           </a:ln>
         </p:spPr>
         <p:style>

</xml_diff>